<commit_message>
Agenda for February 28, 2022
</commit_message>
<xml_diff>
--- a/Agenda Materials/onedm-agenda-2022-02-21.pptx
+++ b/Agenda Materials/onedm-agenda-2022-02-21.pptx
@@ -10443,7 +10443,7 @@
         </p:nvSpPr>
         <p:spPr>
           <a:xfrm>
-            <a:off x="502525" y="1328650"/>
+            <a:off x="523546" y="1149974"/>
             <a:ext cx="8357695" cy="4585555"/>
           </a:xfrm>
         </p:spPr>
@@ -10502,6 +10502,12 @@
             <a:r>
               <a:rPr lang="en-US" dirty="0"/>
               <a:t>All values filled in or nulled</a:t>
+            </a:r>
+          </a:p>
+          <a:p>
+            <a:r>
+              <a:rPr lang="en-US" dirty="0"/>
+              <a:t>Has protocol bindings and ecosystem-specific settings</a:t>
             </a:r>
           </a:p>
           <a:p>
@@ -11062,103 +11068,110 @@
         <p:spPr>
           <a:xfrm>
             <a:off x="925389" y="835573"/>
-            <a:ext cx="7886700" cy="5365530"/>
+            <a:ext cx="7886700" cy="7246882"/>
           </a:xfrm>
         </p:spPr>
         <p:txBody>
           <a:bodyPr>
-            <a:normAutofit/>
+            <a:noAutofit/>
           </a:bodyPr>
           <a:lstStyle/>
           <a:p>
             <a:r>
-              <a:rPr lang="en-US" sz="2400" dirty="0"/>
+              <a:rPr lang="en-US" sz="2000" dirty="0"/>
               <a:t>Namespace and versioning scheme</a:t>
             </a:r>
           </a:p>
           <a:p>
             <a:r>
-              <a:rPr lang="en-US" sz="2400" dirty="0"/>
+              <a:rPr lang="en-US" sz="2000" dirty="0"/>
               <a:t>Playground models don't have a namespace – </a:t>
             </a:r>
           </a:p>
           <a:p>
             <a:pPr lvl="1"/>
             <a:r>
-              <a:rPr lang="en-US" sz="2000" dirty="0"/>
+              <a:rPr lang="en-US" sz="1800" dirty="0"/>
               <a:t>need to add the block</a:t>
             </a:r>
           </a:p>
           <a:p>
             <a:pPr lvl="1"/>
             <a:r>
-              <a:rPr lang="en-US" sz="2000" dirty="0"/>
+              <a:rPr lang="en-US" sz="1800" dirty="0"/>
               <a:t>linter check and warning?</a:t>
             </a:r>
           </a:p>
           <a:p>
             <a:pPr lvl="1"/>
             <a:r>
-              <a:rPr lang="en-US" sz="2000" dirty="0"/>
-              <a:t>Is there a default behavior when there is no namespace reference? (research) no contribution to a global ([https://]</a:t>
-            </a:r>
-            <a:r>
-              <a:rPr lang="en-US" sz="2000" dirty="0" err="1"/>
+              <a:rPr lang="en-US" sz="1800" dirty="0"/>
+              <a:t>Is there a default behavior when there is no namespace reference? (research) no contribution to a global ([https://</a:t>
+            </a:r>
+            <a:r>
+              <a:rPr lang="en-US" sz="1800" dirty="0" err="1"/>
               <a:t>onedm</a:t>
             </a:r>
             <a:r>
-              <a:rPr lang="en-US" sz="2000" dirty="0"/>
+              <a:rPr lang="en-US" sz="1800" dirty="0"/>
               <a:t>) namespace</a:t>
             </a:r>
           </a:p>
           <a:p>
             <a:pPr lvl="1"/>
             <a:r>
-              <a:rPr lang="en-US" sz="2000" dirty="0"/>
+              <a:rPr lang="en-US" sz="1800" dirty="0"/>
+              <a:t>Can't export but can import using explicit prefix </a:t>
+            </a:r>
+          </a:p>
+          <a:p>
+            <a:pPr lvl="1"/>
+            <a:r>
+              <a:rPr lang="en-US" sz="1800" dirty="0"/>
               <a:t>These are theoretically ecosystem URIs (</a:t>
             </a:r>
             <a:r>
-              <a:rPr lang="en-US" sz="2000" dirty="0" err="1"/>
+              <a:rPr lang="en-US" sz="1800" dirty="0" err="1"/>
               <a:t>ocf</a:t>
             </a:r>
             <a:r>
-              <a:rPr lang="en-US" sz="2000" dirty="0"/>
+              <a:rPr lang="en-US" sz="1800" dirty="0"/>
               <a:t>:, </a:t>
             </a:r>
             <a:r>
-              <a:rPr lang="en-US" sz="2000" dirty="0" err="1"/>
+              <a:rPr lang="en-US" sz="1800" dirty="0" err="1"/>
               <a:t>oma</a:t>
             </a:r>
             <a:r>
-              <a:rPr lang="en-US" sz="2000" dirty="0"/>
+              <a:rPr lang="en-US" sz="1800" dirty="0"/>
               <a:t>:</a:t>
             </a:r>
             <a:r>
-              <a:rPr lang="en-US" sz="2000" dirty="0">
+              <a:rPr lang="en-US" sz="1800" dirty="0">
                 <a:sym typeface="Wingdings" pitchFamily="2" charset="2"/>
               </a:rPr>
               <a:t> ) or should they all be </a:t>
             </a:r>
             <a:r>
-              <a:rPr lang="en-US" sz="2000" dirty="0" err="1">
+              <a:rPr lang="en-US" sz="1800" dirty="0" err="1">
                 <a:sym typeface="Wingdings" pitchFamily="2" charset="2"/>
               </a:rPr>
               <a:t>onedm</a:t>
             </a:r>
             <a:r>
-              <a:rPr lang="en-US" sz="2000" dirty="0">
+              <a:rPr lang="en-US" sz="1800" dirty="0">
                 <a:sym typeface="Wingdings" pitchFamily="2" charset="2"/>
               </a:rPr>
               <a:t> – is there a useful constraint beyond "</a:t>
             </a:r>
             <a:r>
-              <a:rPr lang="en-US" sz="2000" dirty="0" err="1">
+              <a:rPr lang="en-US" sz="1800" dirty="0" err="1">
                 <a:sym typeface="Wingdings" pitchFamily="2" charset="2"/>
               </a:rPr>
               <a:t>onedm</a:t>
             </a:r>
             <a:r>
-              <a:rPr lang="en-US" sz="2000" dirty="0">
+              <a:rPr lang="en-US" sz="1800" dirty="0">
                 <a:sym typeface="Wingdings" pitchFamily="2" charset="2"/>
               </a:rPr>
               <a:t>:"</a:t>
@@ -11167,84 +11180,271 @@
           <a:p>
             <a:pPr lvl="2"/>
             <a:r>
-              <a:rPr lang="en-US" sz="1600" dirty="0">
+              <a:rPr lang="en-US" sz="1400" dirty="0">
                 <a:sym typeface="Wingdings" pitchFamily="2" charset="2"/>
               </a:rPr>
-              <a:t>Examples could help trade off</a:t>
-            </a:r>
-            <a:endParaRPr lang="en-US" sz="1600" dirty="0"/>
-          </a:p>
-          <a:p>
-            <a:r>
-              <a:rPr lang="en-US" sz="2400" dirty="0"/>
+              <a:t>Ecosystem root, (</a:t>
+            </a:r>
+            <a:r>
+              <a:rPr lang="en-US" sz="1400" strike="sngStrike" dirty="0" err="1">
+                <a:sym typeface="Wingdings" pitchFamily="2" charset="2"/>
+              </a:rPr>
+              <a:t>github</a:t>
+            </a:r>
+            <a:r>
+              <a:rPr lang="en-US" sz="1400" strike="sngStrike" dirty="0">
+                <a:sym typeface="Wingdings" pitchFamily="2" charset="2"/>
+              </a:rPr>
+              <a:t> root</a:t>
+            </a:r>
+            <a:r>
+              <a:rPr lang="en-US" sz="1400" dirty="0">
+                <a:sym typeface="Wingdings" pitchFamily="2" charset="2"/>
+              </a:rPr>
+              <a:t>), </a:t>
+            </a:r>
+            <a:r>
+              <a:rPr lang="en-US" sz="1400" dirty="0" err="1">
+                <a:sym typeface="Wingdings" pitchFamily="2" charset="2"/>
+              </a:rPr>
+              <a:t>onedm</a:t>
+            </a:r>
+            <a:r>
+              <a:rPr lang="en-US" sz="1400" dirty="0">
+                <a:sym typeface="Wingdings" pitchFamily="2" charset="2"/>
+              </a:rPr>
+              <a:t> root</a:t>
+            </a:r>
+          </a:p>
+          <a:p>
+            <a:pPr lvl="2"/>
+            <a:r>
+              <a:rPr lang="en-US" sz="1400" dirty="0" err="1">
+                <a:sym typeface="Wingdings" pitchFamily="2" charset="2"/>
+              </a:rPr>
+              <a:t>onedm</a:t>
+            </a:r>
+            <a:r>
+              <a:rPr lang="en-US" sz="1400" dirty="0">
+                <a:sym typeface="Wingdings" pitchFamily="2" charset="2"/>
+              </a:rPr>
+              <a:t> is preferred as a unifying principle</a:t>
+            </a:r>
+          </a:p>
+          <a:p>
+            <a:pPr lvl="2"/>
+            <a:r>
+              <a:rPr lang="en-US" sz="1400" dirty="0">
+                <a:sym typeface="Wingdings" pitchFamily="2" charset="2"/>
+              </a:rPr>
+              <a:t>BSD3 strongly recommended and required for adoption</a:t>
+            </a:r>
+          </a:p>
+          <a:p>
+            <a:pPr lvl="2"/>
+            <a:r>
+              <a:rPr lang="en-US" sz="1400" dirty="0">
+                <a:hlinkClick r:id="rId2"/>
+              </a:rPr>
+              <a:t>https://github.com/one-data-model/playground/wiki/Namespaces-and-versions-(2022-02-transition)</a:t>
+            </a:r>
+            <a:endParaRPr lang="en-US" sz="1400" dirty="0"/>
+          </a:p>
+          <a:p>
+            <a:pPr lvl="2"/>
+            <a:r>
+              <a:rPr lang="en-US" sz="1400" dirty="0"/>
+              <a:t>Please make a note in this wiki about what you will do with namespaces</a:t>
+            </a:r>
+          </a:p>
+          <a:p>
+            <a:pPr lvl="2"/>
+            <a:r>
+              <a:rPr lang="en-US" sz="1400" dirty="0"/>
+              <a:t>Ari and </a:t>
+            </a:r>
+            <a:r>
+              <a:rPr lang="en-US" sz="1400" dirty="0" err="1"/>
+              <a:t>Wouter</a:t>
+            </a:r>
+            <a:r>
+              <a:rPr lang="en-US" sz="1400" dirty="0"/>
+              <a:t> will update </a:t>
+            </a:r>
+            <a:r>
+              <a:rPr lang="en-US" sz="1400" dirty="0" err="1"/>
+              <a:t>pg</a:t>
+            </a:r>
+            <a:r>
+              <a:rPr lang="en-US" sz="1400" dirty="0"/>
+              <a:t> models and wiki</a:t>
+            </a:r>
+            <a:endParaRPr lang="en-US" sz="1200" dirty="0"/>
+          </a:p>
+          <a:p>
+            <a:r>
+              <a:rPr lang="en-US" sz="2000" dirty="0"/>
               <a:t>Versioning question</a:t>
             </a:r>
           </a:p>
           <a:p>
             <a:pPr lvl="1"/>
             <a:r>
+              <a:rPr lang="en-US" sz="1800" dirty="0"/>
+              <a:t>What is our resolution of the version marking question?</a:t>
+            </a:r>
+          </a:p>
+          <a:p>
+            <a:pPr lvl="1"/>
+            <a:r>
+              <a:rPr lang="en-US" sz="1800" dirty="0"/>
+              <a:t>Discuss at next call February 21</a:t>
+            </a:r>
+          </a:p>
+          <a:p>
+            <a:pPr lvl="1"/>
+            <a:r>
+              <a:rPr lang="en-US" sz="1800" dirty="0"/>
+              <a:t>Ecosystem-specific versioning - is a string good enough? Monotonicity?</a:t>
+            </a:r>
+          </a:p>
+          <a:p>
+            <a:pPr lvl="1"/>
+            <a:r>
+              <a:rPr lang="en-US" sz="1800" dirty="0"/>
+              <a:t>What are the operations on ecosystem versions</a:t>
+            </a:r>
+          </a:p>
+          <a:p>
+            <a:pPr lvl="1"/>
+            <a:r>
+              <a:rPr lang="en-US" sz="1800" dirty="0"/>
+              <a:t>Recommend using </a:t>
+            </a:r>
+            <a:r>
+              <a:rPr lang="en-US" sz="1800" dirty="0" err="1"/>
+              <a:t>onedm</a:t>
+            </a:r>
+            <a:r>
+              <a:rPr lang="en-US" sz="1800" dirty="0"/>
+              <a:t> scheme - Merging </a:t>
+            </a:r>
+            <a:r>
+              <a:rPr lang="en-US" sz="1800" dirty="0" err="1"/>
+              <a:t>infoblocks</a:t>
+            </a:r>
+            <a:endParaRPr lang="en-US" sz="1800" dirty="0"/>
+          </a:p>
+          <a:p>
+            <a:pPr lvl="1"/>
+            <a:r>
+              <a:rPr lang="en-US" sz="1800" dirty="0"/>
+              <a:t>Writeup needed to provide guidance to contributors where do you put the information in the SDF file – extension points may need more constraints in the SDF draft </a:t>
+            </a:r>
+            <a:r>
+              <a:rPr lang="en-US" sz="1800" dirty="0">
+                <a:sym typeface="Wingdings" pitchFamily="2" charset="2"/>
+              </a:rPr>
+              <a:t> </a:t>
+            </a:r>
+            <a:r>
+              <a:rPr lang="en-US" sz="1800" dirty="0"/>
+              <a:t>&lt;namespace&gt;: how do we validate that the ns is defined?</a:t>
+            </a:r>
+          </a:p>
+          <a:p>
+            <a:pPr lvl="1"/>
+            <a:r>
+              <a:rPr lang="en-US" sz="1800" dirty="0"/>
+              <a:t>Put this in the RFC candidate</a:t>
+            </a:r>
+          </a:p>
+          <a:p>
+            <a:pPr lvl="1"/>
+            <a:r>
+              <a:rPr lang="en-US" sz="1800" dirty="0"/>
+              <a:t>Writeup </a:t>
+            </a:r>
+            <a:r>
+              <a:rPr lang="en-US" sz="1800" dirty="0" err="1"/>
+              <a:t>onedm</a:t>
+            </a:r>
+            <a:r>
+              <a:rPr lang="en-US" sz="1800" dirty="0"/>
+              <a:t> </a:t>
+            </a:r>
+            <a:r>
+              <a:rPr lang="en-US" sz="1800" dirty="0" err="1"/>
+              <a:t>semver</a:t>
+            </a:r>
+            <a:r>
+              <a:rPr lang="en-US" sz="1800" dirty="0"/>
+              <a:t> scheme – action</a:t>
+            </a:r>
+          </a:p>
+          <a:p>
+            <a:pPr marL="0" indent="0">
+              <a:buNone/>
+            </a:pPr>
+            <a:r>
+              <a:rPr lang="en-US" sz="1200" dirty="0"/>
+              <a:t>"info" : {</a:t>
+            </a:r>
+          </a:p>
+          <a:p>
+            <a:pPr marL="0" indent="0">
+              <a:buNone/>
+            </a:pPr>
+            <a:r>
+              <a:rPr lang="en-US" sz="1200" dirty="0"/>
+              <a:t> "</a:t>
+            </a:r>
+            <a:r>
+              <a:rPr lang="en-US" sz="1200" dirty="0" err="1"/>
+              <a:t>oma:version</a:t>
+            </a:r>
+            <a:r>
+              <a:rPr lang="en-US" sz="1200" dirty="0"/>
+              <a:t>" : "1.1"</a:t>
+            </a:r>
+          </a:p>
+          <a:p>
+            <a:pPr marL="0" indent="0">
+              <a:buNone/>
+            </a:pPr>
+            <a:r>
+              <a:rPr lang="en-US" sz="1200" dirty="0"/>
+              <a:t>}</a:t>
+            </a:r>
+          </a:p>
+          <a:p>
+            <a:pPr lvl="1"/>
+            <a:endParaRPr lang="en-US" sz="1800" dirty="0"/>
+          </a:p>
+          <a:p>
+            <a:r>
               <a:rPr lang="en-US" sz="2000" dirty="0"/>
-              <a:t>What is our resolution of the version marking question?</a:t>
+              <a:t>What else needs to be resolved </a:t>
             </a:r>
           </a:p>
           <a:p>
             <a:pPr lvl="1"/>
             <a:r>
-              <a:rPr lang="en-US" sz="2000" dirty="0"/>
-              <a:t>Discuss at next call February 21</a:t>
+              <a:rPr lang="en-US" sz="1800" dirty="0"/>
+              <a:t>SDF questions – JSON number format</a:t>
             </a:r>
           </a:p>
           <a:p>
             <a:pPr lvl="1"/>
             <a:r>
-              <a:rPr lang="en-US" sz="2000" dirty="0"/>
-              <a:t>Ecosystem-specific versioning - is a string good enough?</a:t>
-            </a:r>
-          </a:p>
-          <a:p>
-            <a:pPr lvl="1"/>
-            <a:r>
-              <a:rPr lang="en-US" sz="2000" dirty="0"/>
-              <a:t>Recommend using </a:t>
-            </a:r>
-            <a:r>
-              <a:rPr lang="en-US" sz="2000" dirty="0" err="1"/>
-              <a:t>onedm</a:t>
-            </a:r>
-            <a:r>
-              <a:rPr lang="en-US" sz="2000" dirty="0"/>
-              <a:t> scheme - Merging </a:t>
-            </a:r>
-            <a:r>
-              <a:rPr lang="en-US" sz="2000" dirty="0" err="1"/>
-              <a:t>infoblocks</a:t>
-            </a:r>
-            <a:endParaRPr lang="en-US" sz="2000" dirty="0"/>
-          </a:p>
-          <a:p>
-            <a:r>
-              <a:rPr lang="en-US" sz="2400" dirty="0"/>
-              <a:t>What else needs to be resolved </a:t>
-            </a:r>
-          </a:p>
-          <a:p>
-            <a:pPr lvl="1"/>
-            <a:r>
-              <a:rPr lang="en-US" sz="2000" dirty="0"/>
-              <a:t>SDF questions – JSON number format</a:t>
-            </a:r>
-          </a:p>
-          <a:p>
-            <a:pPr lvl="1"/>
-            <a:r>
-              <a:rPr lang="en-US" sz="2000" dirty="0"/>
+              <a:rPr lang="en-US" sz="1800" dirty="0"/>
               <a:t>Big numbers? 64 bit integer TD, JSON-LD? ASDF issue TBC - </a:t>
             </a:r>
             <a:r>
-              <a:rPr lang="en-US" sz="2000" dirty="0" err="1"/>
+              <a:rPr lang="en-US" sz="1800" dirty="0" err="1"/>
               <a:t>Bigmax</a:t>
             </a:r>
-            <a:endParaRPr lang="en-US" sz="2000" dirty="0"/>
+            <a:endParaRPr lang="en-US" sz="1800" dirty="0"/>
           </a:p>
         </p:txBody>
       </p:sp>

</xml_diff>